<commit_message>
Updating update date and links in WDS trainer presentation
</commit_message>
<xml_diff>
--- a/Whiteboard design session/WDS trainer presentation - Enterprise-class networking in Azure.pptx
+++ b/Whiteboard design session/WDS trainer presentation - Enterprise-class networking in Azure.pptx
@@ -263,7 +263,7 @@
           <a:p>
             <a:fld id="{52A13B17-C506-4D51-BB37-16B365906619}" type="datetimeFigureOut">
               <a:rPr lang="en-US" smtClean="0"/>
-              <a:t>10/29/2021</a:t>
+              <a:t>11/15/2022</a:t>
             </a:fld>
             <a:endParaRPr lang="en-US" dirty="0"/>
           </a:p>
@@ -592,7 +592,7 @@
               <a:defRPr/>
             </a:pPr>
             <a:r>
-              <a:rPr lang="en-US" sz="950" kern="1200" dirty="0">
+              <a:rPr lang="en-US" sz="950" kern="1200">
                 <a:solidFill>
                   <a:schemeClr val="tx1"/>
                 </a:solidFill>
@@ -601,8 +601,17 @@
                 <a:ea typeface="+mn-ea"/>
                 <a:cs typeface="Segoe UI" panose="020B0502040204020203" pitchFamily="34" charset="0"/>
               </a:rPr>
-              <a:t>June 2020 </a:t>
-            </a:r>
+              <a:t>November 2022</a:t>
+            </a:r>
+            <a:endParaRPr lang="en-US" sz="950" kern="1200" dirty="0">
+              <a:solidFill>
+                <a:schemeClr val="tx1"/>
+              </a:solidFill>
+              <a:effectLst/>
+              <a:latin typeface="Segoe UI" panose="020B0502040204020203" pitchFamily="34" charset="0"/>
+              <a:ea typeface="+mn-ea"/>
+              <a:cs typeface="Segoe UI" panose="020B0502040204020203" pitchFamily="34" charset="0"/>
+            </a:endParaRPr>
           </a:p>
           <a:p>
             <a:pPr marL="0" marR="0" lvl="0" indent="0" algn="l" defTabSz="914400" rtl="0" eaLnBrk="1" fontAlgn="auto" latinLnBrk="0" hangingPunct="1">
@@ -2142,7 +2151,7 @@
           <a:p>
             <a:r>
               <a:rPr lang="en-US" dirty="0"/>
-              <a:t>https://docs.microsoft.com/en-us/azure/networking/networking-virtual-datacenter</a:t>
+              <a:t>https://learn.microsoft.com/azure/cloud-adoption-framework/resources/networking-vdc</a:t>
             </a:r>
           </a:p>
         </p:txBody>
@@ -3390,7 +3399,7 @@
                   <a:prstClr val="black"/>
                 </a:solidFill>
               </a:rPr>
-              <a:t>10/29/2021 3:43 PM</a:t>
+              <a:t>11/15/2022 10:49 AM</a:t>
             </a:fld>
             <a:endParaRPr lang="en-US" dirty="0">
               <a:solidFill>

</xml_diff>

<commit_message>
Updating images and text (copyright date and font size check)
</commit_message>
<xml_diff>
--- a/Whiteboard design session/WDS trainer presentation - Enterprise-class networking in Azure.pptx
+++ b/Whiteboard design session/WDS trainer presentation - Enterprise-class networking in Azure.pptx
@@ -263,7 +263,7 @@
           <a:p>
             <a:fld id="{52A13B17-C506-4D51-BB37-16B365906619}" type="datetimeFigureOut">
               <a:rPr lang="en-US" smtClean="0"/>
-              <a:t>11/15/2022</a:t>
+              <a:t>11/22/2022</a:t>
             </a:fld>
             <a:endParaRPr lang="en-US" dirty="0"/>
           </a:p>
@@ -592,7 +592,7 @@
               <a:defRPr/>
             </a:pPr>
             <a:r>
-              <a:rPr lang="en-US" sz="950" kern="1200">
+              <a:rPr lang="en-US" sz="950" kern="1200" dirty="0">
                 <a:solidFill>
                   <a:schemeClr val="tx1"/>
                 </a:solidFill>
@@ -603,15 +603,6 @@
               </a:rPr>
               <a:t>November 2022</a:t>
             </a:r>
-            <a:endParaRPr lang="en-US" sz="950" kern="1200" dirty="0">
-              <a:solidFill>
-                <a:schemeClr val="tx1"/>
-              </a:solidFill>
-              <a:effectLst/>
-              <a:latin typeface="Segoe UI" panose="020B0502040204020203" pitchFamily="34" charset="0"/>
-              <a:ea typeface="+mn-ea"/>
-              <a:cs typeface="Segoe UI" panose="020B0502040204020203" pitchFamily="34" charset="0"/>
-            </a:endParaRPr>
           </a:p>
           <a:p>
             <a:pPr marL="0" marR="0" lvl="0" indent="0" algn="l" defTabSz="914400" rtl="0" eaLnBrk="1" fontAlgn="auto" latinLnBrk="0" hangingPunct="1">
@@ -696,6 +687,18 @@
           </a:p>
           <a:p>
             <a:r>
+              <a:rPr lang="en-US" sz="950" kern="1200">
+                <a:solidFill>
+                  <a:schemeClr val="tx1"/>
+                </a:solidFill>
+                <a:effectLst/>
+                <a:latin typeface="Segoe UI" panose="020B0502040204020203" pitchFamily="34" charset="0"/>
+                <a:ea typeface="+mn-ea"/>
+                <a:cs typeface="Segoe UI" panose="020B0502040204020203" pitchFamily="34" charset="0"/>
+              </a:rPr>
+              <a:t>© 2022 </a:t>
+            </a:r>
+            <a:r>
               <a:rPr lang="en-US" sz="950" kern="1200" dirty="0">
                 <a:solidFill>
                   <a:schemeClr val="tx1"/>
@@ -705,7 +708,7 @@
                 <a:ea typeface="+mn-ea"/>
                 <a:cs typeface="Segoe UI" panose="020B0502040204020203" pitchFamily="34" charset="0"/>
               </a:rPr>
-              <a:t>© 2019 Microsoft Corporation. All rights reserved.</a:t>
+              <a:t>Microsoft Corporation. All rights reserved.</a:t>
             </a:r>
           </a:p>
           <a:p>
@@ -3399,7 +3402,7 @@
                   <a:prstClr val="black"/>
                 </a:solidFill>
               </a:rPr>
-              <a:t>11/15/2022 10:49 AM</a:t>
+              <a:t>11/22/2022 9:07 AM</a:t>
             </a:fld>
             <a:endParaRPr lang="en-US" dirty="0">
               <a:solidFill>
@@ -17596,12 +17599,303 @@
           </a:p>
         </p:txBody>
       </p:sp>
+      <p:sp>
+        <p:nvSpPr>
+          <p:cNvPr id="13" name="TextBox 12">
+            <a:extLst>
+              <a:ext uri="{FF2B5EF4-FFF2-40B4-BE49-F238E27FC236}">
+                <a16:creationId xmlns:a16="http://schemas.microsoft.com/office/drawing/2014/main" id="{7E7AE8F8-75C8-45EA-916D-F986C112572B}"/>
+              </a:ext>
+            </a:extLst>
+          </p:cNvPr>
+          <p:cNvSpPr txBox="1"/>
+          <p:nvPr/>
+        </p:nvSpPr>
+        <p:spPr>
+          <a:xfrm>
+            <a:off x="1965999" y="4353892"/>
+            <a:ext cx="4149484" cy="1855893"/>
+          </a:xfrm>
+          <a:prstGeom prst="rect">
+            <a:avLst/>
+          </a:prstGeom>
+          <a:noFill/>
+        </p:spPr>
+        <p:txBody>
+          <a:bodyPr wrap="square" lIns="182880" tIns="146304" rIns="182880" bIns="146304" rtlCol="0">
+            <a:spAutoFit/>
+          </a:bodyPr>
+          <a:lstStyle/>
+          <a:p>
+            <a:pPr>
+              <a:lnSpc>
+                <a:spcPct val="90000"/>
+              </a:lnSpc>
+              <a:spcAft>
+                <a:spcPts val="600"/>
+              </a:spcAft>
+            </a:pPr>
+            <a:r>
+              <a:rPr lang="en-US" sz="2400" dirty="0">
+                <a:gradFill>
+                  <a:gsLst>
+                    <a:gs pos="2917">
+                      <a:schemeClr val="tx1"/>
+                    </a:gs>
+                    <a:gs pos="30000">
+                      <a:schemeClr val="tx1"/>
+                    </a:gs>
+                  </a:gsLst>
+                  <a:lin ang="5400000" scaled="0"/>
+                </a:gradFill>
+              </a:rPr>
+              <a:t>Virtual machines</a:t>
+            </a:r>
+          </a:p>
+          <a:p>
+            <a:pPr>
+              <a:lnSpc>
+                <a:spcPct val="90000"/>
+              </a:lnSpc>
+              <a:spcAft>
+                <a:spcPts val="600"/>
+              </a:spcAft>
+            </a:pPr>
+            <a:r>
+              <a:rPr lang="en-US" sz="2400" dirty="0">
+                <a:gradFill>
+                  <a:gsLst>
+                    <a:gs pos="2917">
+                      <a:schemeClr val="tx1"/>
+                    </a:gs>
+                    <a:gs pos="30000">
+                      <a:schemeClr val="tx1"/>
+                    </a:gs>
+                  </a:gsLst>
+                  <a:lin ang="5400000" scaled="0"/>
+                </a:gradFill>
+              </a:rPr>
+              <a:t>Virtual networks</a:t>
+            </a:r>
+          </a:p>
+          <a:p>
+            <a:pPr>
+              <a:lnSpc>
+                <a:spcPct val="90000"/>
+              </a:lnSpc>
+              <a:spcAft>
+                <a:spcPts val="600"/>
+              </a:spcAft>
+            </a:pPr>
+            <a:r>
+              <a:rPr lang="en-US" sz="2400" dirty="0">
+                <a:gradFill>
+                  <a:gsLst>
+                    <a:gs pos="2917">
+                      <a:schemeClr val="tx1"/>
+                    </a:gs>
+                    <a:gs pos="30000">
+                      <a:schemeClr val="tx1"/>
+                    </a:gs>
+                  </a:gsLst>
+                  <a:lin ang="5400000" scaled="0"/>
+                </a:gradFill>
+              </a:rPr>
+              <a:t>VPN gateway</a:t>
+            </a:r>
+          </a:p>
+          <a:p>
+            <a:pPr>
+              <a:lnSpc>
+                <a:spcPct val="90000"/>
+              </a:lnSpc>
+              <a:spcAft>
+                <a:spcPts val="600"/>
+              </a:spcAft>
+            </a:pPr>
+            <a:r>
+              <a:rPr lang="en-US" sz="2400" dirty="0">
+                <a:gradFill>
+                  <a:gsLst>
+                    <a:gs pos="2917">
+                      <a:schemeClr val="tx1"/>
+                    </a:gs>
+                    <a:gs pos="30000">
+                      <a:schemeClr val="tx1"/>
+                    </a:gs>
+                  </a:gsLst>
+                  <a:lin ang="5400000" scaled="0"/>
+                </a:gradFill>
+              </a:rPr>
+              <a:t>Virtual appliances</a:t>
+            </a:r>
+          </a:p>
+        </p:txBody>
+      </p:sp>
+      <p:sp>
+        <p:nvSpPr>
+          <p:cNvPr id="18" name="Rectangle 17">
+            <a:extLst>
+              <a:ext uri="{FF2B5EF4-FFF2-40B4-BE49-F238E27FC236}">
+                <a16:creationId xmlns:a16="http://schemas.microsoft.com/office/drawing/2014/main" id="{BA1A90AE-9682-4394-BC32-018C71CCDB30}"/>
+              </a:ext>
+            </a:extLst>
+          </p:cNvPr>
+          <p:cNvSpPr/>
+          <p:nvPr/>
+        </p:nvSpPr>
+        <p:spPr>
+          <a:xfrm>
+            <a:off x="4671958" y="4406909"/>
+            <a:ext cx="3582742" cy="2062103"/>
+          </a:xfrm>
+          <a:prstGeom prst="rect">
+            <a:avLst/>
+          </a:prstGeom>
+        </p:spPr>
+        <p:txBody>
+          <a:bodyPr wrap="square">
+            <a:spAutoFit/>
+          </a:bodyPr>
+          <a:lstStyle/>
+          <a:p>
+            <a:pPr>
+              <a:lnSpc>
+                <a:spcPct val="90000"/>
+              </a:lnSpc>
+              <a:spcAft>
+                <a:spcPts val="600"/>
+              </a:spcAft>
+            </a:pPr>
+            <a:r>
+              <a:rPr lang="en-US" sz="2400" dirty="0">
+                <a:gradFill>
+                  <a:gsLst>
+                    <a:gs pos="2917">
+                      <a:schemeClr val="tx1"/>
+                    </a:gs>
+                    <a:gs pos="30000">
+                      <a:schemeClr val="tx1"/>
+                    </a:gs>
+                  </a:gsLst>
+                  <a:lin ang="5400000" scaled="0"/>
+                </a:gradFill>
+              </a:rPr>
+              <a:t>Hybrid connectivity </a:t>
+            </a:r>
+          </a:p>
+          <a:p>
+            <a:pPr>
+              <a:lnSpc>
+                <a:spcPct val="90000"/>
+              </a:lnSpc>
+              <a:spcAft>
+                <a:spcPts val="600"/>
+              </a:spcAft>
+            </a:pPr>
+            <a:r>
+              <a:rPr lang="en-US" sz="2400" dirty="0">
+                <a:gradFill>
+                  <a:gsLst>
+                    <a:gs pos="2917">
+                      <a:schemeClr val="tx1"/>
+                    </a:gs>
+                    <a:gs pos="30000">
+                      <a:schemeClr val="tx1"/>
+                    </a:gs>
+                  </a:gsLst>
+                  <a:lin ang="5400000" scaled="0"/>
+                </a:gradFill>
+              </a:rPr>
+              <a:t>Load balancers</a:t>
+            </a:r>
+          </a:p>
+          <a:p>
+            <a:pPr>
+              <a:lnSpc>
+                <a:spcPct val="90000"/>
+              </a:lnSpc>
+              <a:spcAft>
+                <a:spcPts val="600"/>
+              </a:spcAft>
+            </a:pPr>
+            <a:r>
+              <a:rPr lang="en-US" sz="2400" dirty="0">
+                <a:gradFill>
+                  <a:gsLst>
+                    <a:gs pos="2917">
+                      <a:schemeClr val="tx1"/>
+                    </a:gs>
+                    <a:gs pos="30000">
+                      <a:schemeClr val="tx1"/>
+                    </a:gs>
+                  </a:gsLst>
+                  <a:lin ang="5400000" scaled="0"/>
+                </a:gradFill>
+              </a:rPr>
+              <a:t>Storage</a:t>
+            </a:r>
+          </a:p>
+          <a:p>
+            <a:pPr>
+              <a:lnSpc>
+                <a:spcPct val="90000"/>
+              </a:lnSpc>
+              <a:spcAft>
+                <a:spcPts val="600"/>
+              </a:spcAft>
+            </a:pPr>
+            <a:r>
+              <a:rPr lang="en-US" sz="2400" dirty="0">
+                <a:gradFill>
+                  <a:gsLst>
+                    <a:gs pos="2917">
+                      <a:schemeClr val="tx1"/>
+                    </a:gs>
+                    <a:gs pos="30000">
+                      <a:schemeClr val="tx1"/>
+                    </a:gs>
+                  </a:gsLst>
+                  <a:lin ang="5400000" scaled="0"/>
+                </a:gradFill>
+              </a:rPr>
+              <a:t>Web Application firewall</a:t>
+            </a:r>
+          </a:p>
+          <a:p>
+            <a:pPr>
+              <a:lnSpc>
+                <a:spcPct val="90000"/>
+              </a:lnSpc>
+              <a:spcAft>
+                <a:spcPts val="600"/>
+              </a:spcAft>
+            </a:pPr>
+            <a:r>
+              <a:rPr lang="en-US" sz="2400" dirty="0">
+                <a:gradFill>
+                  <a:gsLst>
+                    <a:gs pos="2917">
+                      <a:schemeClr val="tx1"/>
+                    </a:gs>
+                    <a:gs pos="30000">
+                      <a:schemeClr val="tx1"/>
+                    </a:gs>
+                  </a:gsLst>
+                  <a:lin ang="5400000" scaled="0"/>
+                </a:gradFill>
+              </a:rPr>
+              <a:t>Azure Firewall</a:t>
+            </a:r>
+          </a:p>
+        </p:txBody>
+      </p:sp>
       <p:pic>
         <p:nvPicPr>
-          <p:cNvPr id="5" name="Picture 4" descr="Infographic of common scenarios&#10;&#10;A diagram that depicts Virtual machines, virtual networks, hybrid connectivity, VPN gateway, virtual appliances, load balancers and storage&#10;">
+          <p:cNvPr id="11" name="Picture 10" descr="Infographic of common scenarios&#10;&#10;A diagram that depicts Virtual machines, virtual networks, hybrid connectivity, VPN gateway, virtual appliances, load balancers and storage&#10;">
             <a:extLst>
               <a:ext uri="{FF2B5EF4-FFF2-40B4-BE49-F238E27FC236}">
-                <a16:creationId xmlns:a16="http://schemas.microsoft.com/office/drawing/2014/main" id="{F2BDFBC7-2E7D-4A4D-AB57-E117ACD98572}"/>
+                <a16:creationId xmlns:a16="http://schemas.microsoft.com/office/drawing/2014/main" id="{EC8FD61B-9DC9-BCA4-1933-ABFCA2C87A0F}"/>
               </a:ext>
             </a:extLst>
           </p:cNvPr>
@@ -17618,305 +17912,14 @@
         </p:blipFill>
         <p:spPr>
           <a:xfrm>
-            <a:off x="1618153" y="1624711"/>
-            <a:ext cx="6248379" cy="2862020"/>
+            <a:off x="2925720" y="1834523"/>
+            <a:ext cx="4127712" cy="2273417"/>
           </a:xfrm>
           <a:prstGeom prst="rect">
             <a:avLst/>
           </a:prstGeom>
         </p:spPr>
       </p:pic>
-      <p:sp>
-        <p:nvSpPr>
-          <p:cNvPr id="13" name="TextBox 12">
-            <a:extLst>
-              <a:ext uri="{FF2B5EF4-FFF2-40B4-BE49-F238E27FC236}">
-                <a16:creationId xmlns:a16="http://schemas.microsoft.com/office/drawing/2014/main" id="{7E7AE8F8-75C8-45EA-916D-F986C112572B}"/>
-              </a:ext>
-            </a:extLst>
-          </p:cNvPr>
-          <p:cNvSpPr txBox="1"/>
-          <p:nvPr/>
-        </p:nvSpPr>
-        <p:spPr>
-          <a:xfrm>
-            <a:off x="1965999" y="4353892"/>
-            <a:ext cx="4149484" cy="1855893"/>
-          </a:xfrm>
-          <a:prstGeom prst="rect">
-            <a:avLst/>
-          </a:prstGeom>
-          <a:noFill/>
-        </p:spPr>
-        <p:txBody>
-          <a:bodyPr wrap="square" lIns="182880" tIns="146304" rIns="182880" bIns="146304" rtlCol="0">
-            <a:spAutoFit/>
-          </a:bodyPr>
-          <a:lstStyle/>
-          <a:p>
-            <a:pPr>
-              <a:lnSpc>
-                <a:spcPct val="90000"/>
-              </a:lnSpc>
-              <a:spcAft>
-                <a:spcPts val="600"/>
-              </a:spcAft>
-            </a:pPr>
-            <a:r>
-              <a:rPr lang="en-US" sz="2400" dirty="0">
-                <a:gradFill>
-                  <a:gsLst>
-                    <a:gs pos="2917">
-                      <a:schemeClr val="tx1"/>
-                    </a:gs>
-                    <a:gs pos="30000">
-                      <a:schemeClr val="tx1"/>
-                    </a:gs>
-                  </a:gsLst>
-                  <a:lin ang="5400000" scaled="0"/>
-                </a:gradFill>
-              </a:rPr>
-              <a:t>Virtual machines</a:t>
-            </a:r>
-          </a:p>
-          <a:p>
-            <a:pPr>
-              <a:lnSpc>
-                <a:spcPct val="90000"/>
-              </a:lnSpc>
-              <a:spcAft>
-                <a:spcPts val="600"/>
-              </a:spcAft>
-            </a:pPr>
-            <a:r>
-              <a:rPr lang="en-US" sz="2400" dirty="0">
-                <a:gradFill>
-                  <a:gsLst>
-                    <a:gs pos="2917">
-                      <a:schemeClr val="tx1"/>
-                    </a:gs>
-                    <a:gs pos="30000">
-                      <a:schemeClr val="tx1"/>
-                    </a:gs>
-                  </a:gsLst>
-                  <a:lin ang="5400000" scaled="0"/>
-                </a:gradFill>
-              </a:rPr>
-              <a:t>Virtual networks</a:t>
-            </a:r>
-          </a:p>
-          <a:p>
-            <a:pPr>
-              <a:lnSpc>
-                <a:spcPct val="90000"/>
-              </a:lnSpc>
-              <a:spcAft>
-                <a:spcPts val="600"/>
-              </a:spcAft>
-            </a:pPr>
-            <a:r>
-              <a:rPr lang="en-US" sz="2400" dirty="0">
-                <a:gradFill>
-                  <a:gsLst>
-                    <a:gs pos="2917">
-                      <a:schemeClr val="tx1"/>
-                    </a:gs>
-                    <a:gs pos="30000">
-                      <a:schemeClr val="tx1"/>
-                    </a:gs>
-                  </a:gsLst>
-                  <a:lin ang="5400000" scaled="0"/>
-                </a:gradFill>
-              </a:rPr>
-              <a:t>VPN gateway</a:t>
-            </a:r>
-          </a:p>
-          <a:p>
-            <a:pPr>
-              <a:lnSpc>
-                <a:spcPct val="90000"/>
-              </a:lnSpc>
-              <a:spcAft>
-                <a:spcPts val="600"/>
-              </a:spcAft>
-            </a:pPr>
-            <a:r>
-              <a:rPr lang="en-US" sz="2400" dirty="0">
-                <a:gradFill>
-                  <a:gsLst>
-                    <a:gs pos="2917">
-                      <a:schemeClr val="tx1"/>
-                    </a:gs>
-                    <a:gs pos="30000">
-                      <a:schemeClr val="tx1"/>
-                    </a:gs>
-                  </a:gsLst>
-                  <a:lin ang="5400000" scaled="0"/>
-                </a:gradFill>
-              </a:rPr>
-              <a:t>Virtual appliances</a:t>
-            </a:r>
-          </a:p>
-        </p:txBody>
-      </p:sp>
-      <p:sp>
-        <p:nvSpPr>
-          <p:cNvPr id="18" name="Rectangle 17">
-            <a:extLst>
-              <a:ext uri="{FF2B5EF4-FFF2-40B4-BE49-F238E27FC236}">
-                <a16:creationId xmlns:a16="http://schemas.microsoft.com/office/drawing/2014/main" id="{BA1A90AE-9682-4394-BC32-018C71CCDB30}"/>
-              </a:ext>
-            </a:extLst>
-          </p:cNvPr>
-          <p:cNvSpPr/>
-          <p:nvPr/>
-        </p:nvSpPr>
-        <p:spPr>
-          <a:xfrm>
-            <a:off x="4671958" y="4406909"/>
-            <a:ext cx="3582742" cy="2062103"/>
-          </a:xfrm>
-          <a:prstGeom prst="rect">
-            <a:avLst/>
-          </a:prstGeom>
-        </p:spPr>
-        <p:txBody>
-          <a:bodyPr wrap="square">
-            <a:spAutoFit/>
-          </a:bodyPr>
-          <a:lstStyle/>
-          <a:p>
-            <a:pPr>
-              <a:lnSpc>
-                <a:spcPct val="90000"/>
-              </a:lnSpc>
-              <a:spcAft>
-                <a:spcPts val="600"/>
-              </a:spcAft>
-            </a:pPr>
-            <a:r>
-              <a:rPr lang="en-US" sz="2400" dirty="0">
-                <a:gradFill>
-                  <a:gsLst>
-                    <a:gs pos="2917">
-                      <a:schemeClr val="tx1"/>
-                    </a:gs>
-                    <a:gs pos="30000">
-                      <a:schemeClr val="tx1"/>
-                    </a:gs>
-                  </a:gsLst>
-                  <a:lin ang="5400000" scaled="0"/>
-                </a:gradFill>
-              </a:rPr>
-              <a:t>Hybrid connectivity </a:t>
-            </a:r>
-          </a:p>
-          <a:p>
-            <a:pPr>
-              <a:lnSpc>
-                <a:spcPct val="90000"/>
-              </a:lnSpc>
-              <a:spcAft>
-                <a:spcPts val="600"/>
-              </a:spcAft>
-            </a:pPr>
-            <a:r>
-              <a:rPr lang="en-US" sz="2400" dirty="0">
-                <a:gradFill>
-                  <a:gsLst>
-                    <a:gs pos="2917">
-                      <a:schemeClr val="tx1"/>
-                    </a:gs>
-                    <a:gs pos="30000">
-                      <a:schemeClr val="tx1"/>
-                    </a:gs>
-                  </a:gsLst>
-                  <a:lin ang="5400000" scaled="0"/>
-                </a:gradFill>
-              </a:rPr>
-              <a:t>Load balancers</a:t>
-            </a:r>
-          </a:p>
-          <a:p>
-            <a:pPr>
-              <a:lnSpc>
-                <a:spcPct val="90000"/>
-              </a:lnSpc>
-              <a:spcAft>
-                <a:spcPts val="600"/>
-              </a:spcAft>
-            </a:pPr>
-            <a:r>
-              <a:rPr lang="en-US" sz="2400" dirty="0">
-                <a:gradFill>
-                  <a:gsLst>
-                    <a:gs pos="2917">
-                      <a:schemeClr val="tx1"/>
-                    </a:gs>
-                    <a:gs pos="30000">
-                      <a:schemeClr val="tx1"/>
-                    </a:gs>
-                  </a:gsLst>
-                  <a:lin ang="5400000" scaled="0"/>
-                </a:gradFill>
-              </a:rPr>
-              <a:t>Storage</a:t>
-            </a:r>
-          </a:p>
-          <a:p>
-            <a:pPr>
-              <a:lnSpc>
-                <a:spcPct val="90000"/>
-              </a:lnSpc>
-              <a:spcAft>
-                <a:spcPts val="600"/>
-              </a:spcAft>
-            </a:pPr>
-            <a:r>
-              <a:rPr lang="en-US" sz="2400" dirty="0">
-                <a:gradFill>
-                  <a:gsLst>
-                    <a:gs pos="2917">
-                      <a:schemeClr val="tx1"/>
-                    </a:gs>
-                    <a:gs pos="30000">
-                      <a:schemeClr val="tx1"/>
-                    </a:gs>
-                  </a:gsLst>
-                  <a:lin ang="5400000" scaled="0"/>
-                </a:gradFill>
-              </a:rPr>
-              <a:t>Web Application firewall</a:t>
-            </a:r>
-          </a:p>
-          <a:p>
-            <a:pPr>
-              <a:lnSpc>
-                <a:spcPct val="90000"/>
-              </a:lnSpc>
-              <a:spcAft>
-                <a:spcPts val="600"/>
-              </a:spcAft>
-            </a:pPr>
-            <a:r>
-              <a:rPr lang="en-US" sz="2400" dirty="0">
-                <a:gradFill>
-                  <a:gsLst>
-                    <a:gs pos="2917">
-                      <a:schemeClr val="tx1"/>
-                    </a:gs>
-                    <a:gs pos="30000">
-                      <a:schemeClr val="tx1"/>
-                    </a:gs>
-                  </a:gsLst>
-                  <a:lin ang="5400000" scaled="0"/>
-                </a:gradFill>
-              </a:rPr>
-              <a:t>Azure Firewall</a:t>
-            </a:r>
-          </a:p>
-        </p:txBody>
-      </p:sp>
     </p:spTree>
     <p:extLst>
       <p:ext uri="{BB962C8B-B14F-4D97-AF65-F5344CB8AC3E}">
@@ -18116,7 +18119,7 @@
         </p:nvSpPr>
         <p:spPr>
           <a:xfrm>
-            <a:off x="362057" y="1741246"/>
+            <a:off x="333200" y="996182"/>
             <a:ext cx="10652686" cy="2930033"/>
           </a:xfrm>
           <a:prstGeom prst="rect">
@@ -18223,14 +18226,14 @@
           <p:nvPr>
             <p:extLst>
               <p:ext uri="{D42A27DB-BD31-4B8C-83A1-F6EECF244321}">
-                <p14:modId xmlns:p14="http://schemas.microsoft.com/office/powerpoint/2010/main" val="454862729"/>
+                <p14:modId xmlns:p14="http://schemas.microsoft.com/office/powerpoint/2010/main" val="2080097114"/>
               </p:ext>
             </p:extLst>
           </p:nvPr>
         </p:nvGraphicFramePr>
         <p:xfrm>
-          <a:off x="3095545" y="3791921"/>
-          <a:ext cx="8040154" cy="2420452"/>
+          <a:off x="3529038" y="2647227"/>
+          <a:ext cx="8040154" cy="3767862"/>
         </p:xfrm>
         <a:graphic>
           <a:graphicData uri="http://schemas.openxmlformats.org/drawingml/2006/table">
@@ -18261,14 +18264,14 @@
                     <a:lstStyle/>
                     <a:p>
                       <a:r>
-                        <a:rPr lang="en-US" sz="1300" b="1" i="1" dirty="0">
+                        <a:rPr lang="en-US" sz="1800" b="1" i="1" dirty="0">
                           <a:latin typeface="Segoe UI" panose="020B0502040204020203" pitchFamily="34" charset="0"/>
                           <a:cs typeface="Segoe UI" panose="020B0502040204020203" pitchFamily="34" charset="0"/>
                         </a:rPr>
                         <a:t>Business</a:t>
                       </a:r>
                       <a:r>
-                        <a:rPr lang="en-US" sz="1300" b="1" i="1" kern="1200" dirty="0">
+                        <a:rPr lang="en-US" sz="1800" b="1" i="1" kern="1200" dirty="0">
                           <a:solidFill>
                             <a:schemeClr val="dk1"/>
                           </a:solidFill>
@@ -18281,19 +18284,19 @@
                     </a:p>
                     <a:p>
                       <a:r>
-                        <a:rPr lang="en-US" sz="1300" b="0" i="0" dirty="0">
+                        <a:rPr lang="en-US" sz="1800" b="0" i="0" dirty="0">
                           <a:latin typeface="Segoe UI" panose="020B0502040204020203" pitchFamily="34" charset="0"/>
                           <a:cs typeface="Segoe UI" panose="020B0502040204020203" pitchFamily="34" charset="0"/>
                         </a:rPr>
                         <a:t>(15 minutes)</a:t>
                       </a:r>
                       <a:br>
-                        <a:rPr lang="en-US" sz="1300" b="0" i="0" dirty="0">
+                        <a:rPr lang="en-US" sz="1800" b="0" i="0" dirty="0">
                           <a:latin typeface="Segoe UI" panose="020B0502040204020203" pitchFamily="34" charset="0"/>
                           <a:cs typeface="Segoe UI" panose="020B0502040204020203" pitchFamily="34" charset="0"/>
                         </a:rPr>
                       </a:br>
-                      <a:endParaRPr lang="en-US" sz="1300" b="0" i="0" dirty="0">
+                      <a:endParaRPr lang="en-US" sz="1800" b="0" i="0" dirty="0">
                         <a:latin typeface="Segoe UI" panose="020B0502040204020203" pitchFamily="34" charset="0"/>
                         <a:cs typeface="Segoe UI" panose="020B0502040204020203" pitchFamily="34" charset="0"/>
                       </a:endParaRPr>
@@ -18324,7 +18327,7 @@
                         <a:defRPr/>
                       </a:pPr>
                       <a:r>
-                        <a:rPr lang="en-US" sz="1300" b="0" dirty="0">
+                        <a:rPr lang="en-US" sz="1800" b="0" dirty="0">
                           <a:solidFill>
                             <a:schemeClr val="bg1"/>
                           </a:solidFill>
@@ -18350,7 +18353,7 @@
                     <a:lstStyle/>
                     <a:p>
                       <a:r>
-                        <a:rPr lang="en-US" sz="1300" b="1" i="1" dirty="0">
+                        <a:rPr lang="en-US" sz="1800" b="1" i="1" dirty="0">
                           <a:latin typeface="Segoe UI" panose="020B0502040204020203" pitchFamily="34" charset="0"/>
                           <a:cs typeface="Segoe UI" panose="020B0502040204020203" pitchFamily="34" charset="0"/>
                         </a:rPr>
@@ -18360,7 +18363,7 @@
                     <a:p>
                       <a:pPr marL="0" algn="l" defTabSz="932742" rtl="0" eaLnBrk="1" latinLnBrk="0" hangingPunct="1"/>
                       <a:r>
-                        <a:rPr lang="en-US" sz="1300" b="0" i="0" kern="1200" dirty="0">
+                        <a:rPr lang="en-US" sz="1800" b="0" i="0" kern="1200" dirty="0">
                           <a:solidFill>
                             <a:schemeClr val="dk1"/>
                           </a:solidFill>
@@ -18371,7 +18374,7 @@
                         <a:t>(35 minutes)</a:t>
                       </a:r>
                       <a:br>
-                        <a:rPr lang="en-US" sz="1300" b="0" i="0" kern="1200" dirty="0">
+                        <a:rPr lang="en-US" sz="1800" b="0" i="0" kern="1200" dirty="0">
                           <a:solidFill>
                             <a:schemeClr val="dk1"/>
                           </a:solidFill>
@@ -18380,7 +18383,7 @@
                           <a:cs typeface="Segoe UI" panose="020B0502040204020203" pitchFamily="34" charset="0"/>
                         </a:rPr>
                       </a:br>
-                      <a:endParaRPr lang="en-US" sz="1300" b="0" i="0" kern="1200" dirty="0">
+                      <a:endParaRPr lang="en-US" sz="1800" b="0" i="0" kern="1200" dirty="0">
                         <a:solidFill>
                           <a:schemeClr val="dk1"/>
                         </a:solidFill>
@@ -18415,7 +18418,7 @@
                         <a:defRPr/>
                       </a:pPr>
                       <a:r>
-                        <a:rPr lang="en-US" sz="1300" kern="1200" baseline="0" dirty="0">
+                        <a:rPr lang="en-US" sz="1800" kern="1200" baseline="0" dirty="0">
                           <a:solidFill>
                             <a:schemeClr val="bg1"/>
                           </a:solidFill>
@@ -18442,7 +18445,7 @@
                     <a:lstStyle/>
                     <a:p>
                       <a:r>
-                        <a:rPr lang="en-US" sz="1300" b="1" i="1" dirty="0">
+                        <a:rPr lang="en-US" sz="1800" b="1" i="1" dirty="0">
                           <a:latin typeface="Segoe UI" panose="020B0502040204020203" pitchFamily="34" charset="0"/>
                           <a:cs typeface="Segoe UI" panose="020B0502040204020203" pitchFamily="34" charset="0"/>
                         </a:rPr>
@@ -18468,7 +18471,7 @@
                         <a:defRPr/>
                       </a:pPr>
                       <a:r>
-                        <a:rPr lang="en-US" sz="1300" b="0" i="0" kern="1200" dirty="0">
+                        <a:rPr lang="en-US" sz="1800" b="0" i="0" kern="1200" dirty="0">
                           <a:solidFill>
                             <a:schemeClr val="dk1"/>
                           </a:solidFill>
@@ -18480,7 +18483,7 @@
                       </a:r>
                     </a:p>
                     <a:p>
-                      <a:endParaRPr lang="en-US" sz="1300" b="1" i="1" dirty="0">
+                      <a:endParaRPr lang="en-US" sz="1800" b="1" i="1" dirty="0">
                         <a:latin typeface="Segoe UI" panose="020B0502040204020203" pitchFamily="34" charset="0"/>
                         <a:cs typeface="Segoe UI" panose="020B0502040204020203" pitchFamily="34" charset="0"/>
                       </a:endParaRPr>
@@ -18498,7 +18501,7 @@
                         <a:buChar char="•"/>
                       </a:pPr>
                       <a:r>
-                        <a:rPr lang="en-US" sz="1300" dirty="0">
+                        <a:rPr lang="en-US" sz="1800" dirty="0">
                           <a:latin typeface="Segoe UI" panose="020B0502040204020203" pitchFamily="34" charset="0"/>
                           <a:cs typeface="Segoe UI" panose="020B0502040204020203" pitchFamily="34" charset="0"/>
                         </a:rPr>
@@ -18511,7 +18514,7 @@
                         <a:buChar char="•"/>
                       </a:pPr>
                       <a:r>
-                        <a:rPr lang="en-US" sz="1300" dirty="0">
+                        <a:rPr lang="en-US" sz="1800" dirty="0">
                           <a:latin typeface="Segoe UI" panose="020B0502040204020203" pitchFamily="34" charset="0"/>
                           <a:cs typeface="Segoe UI" panose="020B0502040204020203" pitchFamily="34" charset="0"/>
                         </a:rPr>
@@ -18524,7 +18527,7 @@
                         <a:buChar char="•"/>
                       </a:pPr>
                       <a:r>
-                        <a:rPr lang="en-US" sz="1300" dirty="0">
+                        <a:rPr lang="en-US" sz="1800" dirty="0">
                           <a:latin typeface="Segoe UI" panose="020B0502040204020203" pitchFamily="34" charset="0"/>
                           <a:cs typeface="Segoe UI" panose="020B0502040204020203" pitchFamily="34" charset="0"/>
                         </a:rPr>
@@ -18537,19 +18540,19 @@
                         <a:buChar char="•"/>
                       </a:pPr>
                       <a:r>
-                        <a:rPr lang="en-US" sz="1300" dirty="0">
+                        <a:rPr lang="en-US" sz="1800" dirty="0">
                           <a:latin typeface="Segoe UI" panose="020B0502040204020203" pitchFamily="34" charset="0"/>
                           <a:cs typeface="Segoe UI" panose="020B0502040204020203" pitchFamily="34" charset="0"/>
                         </a:rPr>
                         <a:t>Prepare for a 15-minute presentation to the customer.</a:t>
                       </a:r>
                       <a:br>
-                        <a:rPr lang="en-US" sz="1300" dirty="0">
+                        <a:rPr lang="en-US" sz="1800" dirty="0">
                           <a:latin typeface="Segoe UI" panose="020B0502040204020203" pitchFamily="34" charset="0"/>
                           <a:cs typeface="Segoe UI" panose="020B0502040204020203" pitchFamily="34" charset="0"/>
                         </a:rPr>
                       </a:br>
-                      <a:endParaRPr lang="en-US" sz="1300" dirty="0">
+                      <a:endParaRPr lang="en-US" sz="1800" dirty="0">
                         <a:latin typeface="Segoe UI" panose="020B0502040204020203" pitchFamily="34" charset="0"/>
                         <a:cs typeface="Segoe UI" panose="020B0502040204020203" pitchFamily="34" charset="0"/>
                       </a:endParaRPr>

</xml_diff>